<commit_message>
Update Presentation for Submit Prediction.pptx
</commit_message>
<xml_diff>
--- a/src/Presentation for Submit Prediction.pptx
+++ b/src/Presentation for Submit Prediction.pptx
@@ -232,7 +232,7 @@
           <a:p>
             <a:fld id="{680A23AC-7150-364F-987A-5F47E79D1B13}" type="datetimeFigureOut">
               <a:rPr lang="en-US" smtClean="0"/>
-              <a:t>3/31/21</a:t>
+              <a:t>04/10/2021</a:t>
             </a:fld>
             <a:endParaRPr lang="en-US" dirty="0"/>
           </a:p>
@@ -451,7 +451,7 @@
           <a:p>
             <a:fld id="{E0705641-FB27-7B4E-B4C1-050F58A69A04}" type="datetimeFigureOut">
               <a:rPr lang="en-US" smtClean="0"/>
-              <a:t>3/31/21</a:t>
+              <a:t>04/10/2021</a:t>
             </a:fld>
             <a:endParaRPr lang="en-US" dirty="0"/>
           </a:p>
@@ -1183,7 +1183,7 @@
           <a:p>
             <a:fld id="{48215991-F7FF-4216-96F5-655212457027}" type="datetimeFigureOut">
               <a:rPr lang="en-US" smtClean="0"/>
-              <a:t>3/31/21</a:t>
+              <a:t>04/10/2021</a:t>
             </a:fld>
             <a:endParaRPr lang="en-US" dirty="0"/>
           </a:p>
@@ -13472,7 +13472,7 @@
           <a:p>
             <a:fld id="{48215991-F7FF-4216-96F5-655212457027}" type="datetimeFigureOut">
               <a:rPr lang="en-US" smtClean="0"/>
-              <a:t>3/31/21</a:t>
+              <a:t>04/10/2021</a:t>
             </a:fld>
             <a:endParaRPr lang="en-US" dirty="0"/>
           </a:p>
@@ -13970,7 +13970,7 @@
           <a:p>
             <a:fld id="{ABAF10E3-3651-4C75-85F3-193B4E2345D3}" type="datetimeFigureOut">
               <a:rPr lang="en-US" smtClean="0"/>
-              <a:t>3/31/21</a:t>
+              <a:t>04/10/2021</a:t>
             </a:fld>
             <a:endParaRPr lang="en-US" dirty="0"/>
           </a:p>
@@ -14470,7 +14470,7 @@
           <a:p>
             <a:fld id="{5934C8A5-88CA-4AA7-91EC-2D088AFA102A}" type="datetimeFigureOut">
               <a:rPr lang="en-US" smtClean="0"/>
-              <a:t>3/31/21</a:t>
+              <a:t>04/10/2021</a:t>
             </a:fld>
             <a:endParaRPr lang="en-US" dirty="0"/>
           </a:p>
@@ -14970,7 +14970,7 @@
           <a:p>
             <a:fld id="{9C0E1008-E7AD-446A-A447-80C4AA7286F2}" type="datetimeFigureOut">
               <a:rPr lang="en-US" smtClean="0"/>
-              <a:t>3/31/21</a:t>
+              <a:t>04/10/2021</a:t>
             </a:fld>
             <a:endParaRPr lang="en-US" dirty="0"/>
           </a:p>
@@ -15470,7 +15470,7 @@
           <a:p>
             <a:fld id="{1E533294-7D9E-1940-A9CC-501646959418}" type="datetimeFigureOut">
               <a:rPr lang="en-US" smtClean="0"/>
-              <a:t>3/31/21</a:t>
+              <a:t>04/10/2021</a:t>
             </a:fld>
             <a:endParaRPr lang="en-US" dirty="0"/>
           </a:p>
@@ -15979,7 +15979,7 @@
                 </a:solidFill>
               </a:rPr>
               <a:pPr/>
-              <a:t>3/31/21</a:t>
+              <a:t>04/10/2021</a:t>
             </a:fld>
             <a:endParaRPr lang="en-US" dirty="0">
               <a:solidFill>
@@ -16512,7 +16512,7 @@
                 </a:solidFill>
               </a:rPr>
               <a:pPr/>
-              <a:t>3/31/21</a:t>
+              <a:t>04/10/2021</a:t>
             </a:fld>
             <a:endParaRPr lang="en-US" dirty="0">
               <a:solidFill>
@@ -17045,7 +17045,7 @@
                 </a:solidFill>
               </a:rPr>
               <a:pPr/>
-              <a:t>3/31/21</a:t>
+              <a:t>04/10/2021</a:t>
             </a:fld>
             <a:endParaRPr lang="en-US" dirty="0">
               <a:solidFill>
@@ -17470,7 +17470,7 @@
         <p:spPr>
           <a:xfrm>
             <a:off x="578644" y="1624398"/>
-            <a:ext cx="7986712" cy="1932839"/>
+            <a:ext cx="7986712" cy="3376227"/>
           </a:xfrm>
         </p:spPr>
         <p:txBody>
@@ -17479,19 +17479,35 @@
           </a:bodyPr>
           <a:lstStyle/>
           <a:p>
-            <a:pPr algn="ctr"/>
-            <a:r>
-              <a:rPr lang="en-US" spc="120" dirty="0">
+            <a:pPr algn="ctr">
+              <a:lnSpc>
+                <a:spcPct val="200000"/>
+              </a:lnSpc>
+            </a:pPr>
+            <a:r>
+              <a:rPr lang="en-US" b="0" spc="120" dirty="0">
                 <a:solidFill>
                   <a:srgbClr val="002060"/>
                 </a:solidFill>
+                <a:latin typeface="Lato" panose="020F0502020204030203" pitchFamily="34" charset="0"/>
               </a:rPr>
-              <a:t>MINIMIZING PAID ADVERTISING COSTS BY PREDICTING THE USERS WHO ARE LIKELY TO SUBMIT A LEAD FORM</a:t>
-            </a:r>
-          </a:p>
-          <a:p>
-            <a:pPr algn="ctr"/>
-            <a:endParaRPr lang="en-US" dirty="0"/>
+              <a:t>MINIMIZING PAID ADVERTISING COSTS BY PREDICTING THE USERS WHO ARE LIKELY TO SUBMIT A LEAD </a:t>
+            </a:r>
+            <a:r>
+              <a:rPr lang="en-US" b="0" spc="120" dirty="0" smtClean="0">
+                <a:solidFill>
+                  <a:srgbClr val="002060"/>
+                </a:solidFill>
+                <a:latin typeface="Lato" panose="020F0502020204030203" pitchFamily="34" charset="0"/>
+              </a:rPr>
+              <a:t>FORM</a:t>
+            </a:r>
+            <a:endParaRPr lang="en-US" b="0" spc="120" dirty="0">
+              <a:solidFill>
+                <a:srgbClr val="002060"/>
+              </a:solidFill>
+              <a:latin typeface="Lato" panose="020F0502020204030203" pitchFamily="34" charset="0"/>
+            </a:endParaRPr>
           </a:p>
         </p:txBody>
       </p:sp>
@@ -17513,8 +17529,8 @@
         </p:nvSpPr>
         <p:spPr>
           <a:xfrm>
-            <a:off x="3537101" y="5672023"/>
-            <a:ext cx="2069797" cy="246221"/>
+            <a:off x="4086128" y="5672023"/>
+            <a:ext cx="971740" cy="400110"/>
           </a:xfrm>
           <a:prstGeom prst="rect">
             <a:avLst/>
@@ -17534,7 +17550,30 @@
                   <a:srgbClr val="002060"/>
                 </a:solidFill>
               </a:rPr>
-              <a:t>Prepared By : TACETTIN ARICI</a:t>
+              <a:t>Prepared </a:t>
+            </a:r>
+            <a:r>
+              <a:rPr lang="en-US" b="1" dirty="0" smtClean="0">
+                <a:solidFill>
+                  <a:srgbClr val="002060"/>
+                </a:solidFill>
+              </a:rPr>
+              <a:t>By</a:t>
+            </a:r>
+            <a:br>
+              <a:rPr lang="en-US" b="1" dirty="0" smtClean="0">
+                <a:solidFill>
+                  <a:srgbClr val="002060"/>
+                </a:solidFill>
+              </a:rPr>
+            </a:br>
+            <a:r>
+              <a:rPr lang="en-US" b="1" dirty="0" smtClean="0">
+                <a:solidFill>
+                  <a:srgbClr val="002060"/>
+                </a:solidFill>
+              </a:rPr>
+              <a:t>Huseyin Elci</a:t>
             </a:r>
             <a:endParaRPr lang="en-US" dirty="0">
               <a:solidFill>
@@ -17857,7 +17896,7 @@
           <p:nvPr/>
         </p:nvPicPr>
         <p:blipFill rotWithShape="1">
-          <a:blip r:embed="rId3">
+          <a:blip r:embed="rId3" cstate="email">
             <a:clrChange>
               <a:clrFrom>
                 <a:srgbClr val="FFFFFF"/>
@@ -17956,7 +17995,7 @@
           <p:nvPr/>
         </p:nvPicPr>
         <p:blipFill>
-          <a:blip r:embed="rId2">
+          <a:blip r:embed="rId2" cstate="email">
             <a:extLst>
               <a:ext uri="{28A0092B-C50C-407E-A947-70E740481C1C}">
                 <a14:useLocalDpi xmlns:a14="http://schemas.microsoft.com/office/drawing/2010/main" val="0"/>
@@ -17992,7 +18031,7 @@
           <p:nvPr/>
         </p:nvPicPr>
         <p:blipFill>
-          <a:blip r:embed="rId3">
+          <a:blip r:embed="rId3" cstate="email">
             <a:clrChange>
               <a:clrFrom>
                 <a:srgbClr val="FFFFFF"/>
@@ -18431,7 +18470,7 @@
         </p:nvSpPr>
         <p:spPr>
           <a:xfrm>
-            <a:off x="731520" y="2549562"/>
+            <a:off x="731520" y="4730787"/>
             <a:ext cx="7324672" cy="1149556"/>
           </a:xfrm>
         </p:spPr>
@@ -18454,16 +18493,10 @@
               <a:buNone/>
             </a:pPr>
             <a:r>
-              <a:rPr lang="en-US" sz="2000" b="1" dirty="0" err="1">
+              <a:rPr lang="en-US" sz="2000" b="1" dirty="0" smtClean="0">
                 <a:sym typeface="Wingdings" pitchFamily="2" charset="2"/>
               </a:rPr>
-              <a:t>Tacettin</a:t>
-            </a:r>
-            <a:r>
-              <a:rPr lang="en-US" sz="2000" b="1" dirty="0">
-                <a:sym typeface="Wingdings" pitchFamily="2" charset="2"/>
-              </a:rPr>
-              <a:t> ARICI</a:t>
+              <a:t>Huseyin Elci</a:t>
             </a:r>
             <a:endParaRPr lang="en-US" sz="2000" b="1" dirty="0"/>
           </a:p>
@@ -18606,7 +18639,7 @@
           <p:nvPr/>
         </p:nvPicPr>
         <p:blipFill>
-          <a:blip r:embed="rId2">
+          <a:blip r:embed="rId2" cstate="email">
             <a:extLst>
               <a:ext uri="{28A0092B-C50C-407E-A947-70E740481C1C}">
                 <a14:useLocalDpi xmlns:a14="http://schemas.microsoft.com/office/drawing/2010/main" val="0"/>
@@ -18806,8 +18839,8 @@
             <a:chExt cx="92160" cy="3600"/>
           </a:xfrm>
         </p:grpSpPr>
-        <mc:AlternateContent xmlns:mc="http://schemas.openxmlformats.org/markup-compatibility/2006">
-          <mc:Choice xmlns:p14="http://schemas.microsoft.com/office/powerpoint/2010/main" Requires="p14">
+        <mc:AlternateContent xmlns:mc="http://schemas.openxmlformats.org/markup-compatibility/2006" xmlns:p14="http://schemas.microsoft.com/office/powerpoint/2010/main">
+          <mc:Choice Requires="p14">
             <p:contentPart p14:bwMode="auto" r:id="rId2">
               <p14:nvContentPartPr>
                 <p14:cNvPr id="4" name="Ink 3">
@@ -18826,7 +18859,7 @@
               </p14:xfrm>
             </p:contentPart>
           </mc:Choice>
-          <mc:Fallback>
+          <mc:Fallback xmlns="">
             <p:pic>
               <p:nvPicPr>
                 <p:cNvPr id="4" name="Ink 3">
@@ -18857,8 +18890,8 @@
             </p:pic>
           </mc:Fallback>
         </mc:AlternateContent>
-        <mc:AlternateContent xmlns:mc="http://schemas.openxmlformats.org/markup-compatibility/2006">
-          <mc:Choice xmlns:p14="http://schemas.microsoft.com/office/powerpoint/2010/main" Requires="p14">
+        <mc:AlternateContent xmlns:mc="http://schemas.openxmlformats.org/markup-compatibility/2006" xmlns:p14="http://schemas.microsoft.com/office/powerpoint/2010/main">
+          <mc:Choice Requires="p14">
             <p:contentPart p14:bwMode="auto" r:id="rId4">
               <p14:nvContentPartPr>
                 <p14:cNvPr id="6" name="Ink 5">
@@ -18877,7 +18910,7 @@
               </p14:xfrm>
             </p:contentPart>
           </mc:Choice>
-          <mc:Fallback>
+          <mc:Fallback xmlns="">
             <p:pic>
               <p:nvPicPr>
                 <p:cNvPr id="6" name="Ink 5">
@@ -18924,7 +18957,7 @@
           <p:nvPr/>
         </p:nvPicPr>
         <p:blipFill>
-          <a:blip r:embed="rId6">
+          <a:blip r:embed="rId6" cstate="email">
             <a:extLst>
               <a:ext uri="{28A0092B-C50C-407E-A947-70E740481C1C}">
                 <a14:useLocalDpi xmlns:a14="http://schemas.microsoft.com/office/drawing/2010/main" val="0"/>
@@ -19042,7 +19075,7 @@
                 <a16:creationId xmlns:a16="http://schemas.microsoft.com/office/drawing/2014/main" id="{EC8B020A-37CA-AF4C-B17A-EFA7B09EA866}"/>
               </a:ext>
               <a:ext uri="{C183D7F6-B498-43B3-948B-1728B52AA6E4}">
-                <adec:decorative xmlns:adec="http://schemas.microsoft.com/office/drawing/2017/decorative" val="1"/>
+                <adec:decorative xmlns:adec="http://schemas.microsoft.com/office/drawing/2017/decorative" xmlns="" val="1"/>
               </a:ext>
             </a:extLst>
           </p:cNvPr>
@@ -19052,7 +19085,7 @@
           <p:nvPr/>
         </p:nvPicPr>
         <p:blipFill>
-          <a:blip r:embed="rId3">
+          <a:blip r:embed="rId3" cstate="email">
             <a:extLst>
               <a:ext uri="{28A0092B-C50C-407E-A947-70E740481C1C}">
                 <a14:useLocalDpi xmlns:a14="http://schemas.microsoft.com/office/drawing/2010/main" val="0"/>
@@ -19088,7 +19121,7 @@
           <p:nvPr/>
         </p:nvPicPr>
         <p:blipFill>
-          <a:blip r:embed="rId4">
+          <a:blip r:embed="rId4" cstate="email">
             <a:extLst>
               <a:ext uri="{28A0092B-C50C-407E-A947-70E740481C1C}">
                 <a14:useLocalDpi xmlns:a14="http://schemas.microsoft.com/office/drawing/2010/main" val="0"/>
@@ -19604,7 +19637,7 @@
           <p:nvPr/>
         </p:nvPicPr>
         <p:blipFill>
-          <a:blip r:embed="rId3">
+          <a:blip r:embed="rId3" cstate="email">
             <a:extLst>
               <a:ext uri="{28A0092B-C50C-407E-A947-70E740481C1C}">
                 <a14:useLocalDpi xmlns:a14="http://schemas.microsoft.com/office/drawing/2010/main" val="0"/>
@@ -19640,7 +19673,7 @@
           <p:nvPr/>
         </p:nvPicPr>
         <p:blipFill>
-          <a:blip r:embed="rId4">
+          <a:blip r:embed="rId4" cstate="email">
             <a:extLst>
               <a:ext uri="{28A0092B-C50C-407E-A947-70E740481C1C}">
                 <a14:useLocalDpi xmlns:a14="http://schemas.microsoft.com/office/drawing/2010/main" val="0"/>
@@ -19844,7 +19877,7 @@
           <p:nvPr/>
         </p:nvPicPr>
         <p:blipFill>
-          <a:blip r:embed="rId2">
+          <a:blip r:embed="rId2" cstate="email">
             <a:extLst>
               <a:ext uri="{28A0092B-C50C-407E-A947-70E740481C1C}">
                 <a14:useLocalDpi xmlns:a14="http://schemas.microsoft.com/office/drawing/2010/main" val="0"/>
@@ -19986,7 +20019,7 @@
           <p:nvPr/>
         </p:nvPicPr>
         <p:blipFill>
-          <a:blip r:embed="rId3">
+          <a:blip r:embed="rId3" cstate="email">
             <a:extLst>
               <a:ext uri="{28A0092B-C50C-407E-A947-70E740481C1C}">
                 <a14:useLocalDpi xmlns:a14="http://schemas.microsoft.com/office/drawing/2010/main" val="0"/>
@@ -20180,7 +20213,7 @@
           <p:nvPr/>
         </p:nvPicPr>
         <p:blipFill>
-          <a:blip r:embed="rId2">
+          <a:blip r:embed="rId2" cstate="email">
             <a:extLst>
               <a:ext uri="{28A0092B-C50C-407E-A947-70E740481C1C}">
                 <a14:useLocalDpi xmlns:a14="http://schemas.microsoft.com/office/drawing/2010/main" val="0"/>
@@ -20270,7 +20303,7 @@
           <p:nvPr/>
         </p:nvPicPr>
         <p:blipFill rotWithShape="1">
-          <a:blip r:embed="rId2">
+          <a:blip r:embed="rId2" cstate="email">
             <a:extLst>
               <a:ext uri="{28A0092B-C50C-407E-A947-70E740481C1C}">
                 <a14:useLocalDpi xmlns:a14="http://schemas.microsoft.com/office/drawing/2010/main" val="0"/>

</xml_diff>